<commit_message>
ajustes de redaccion de presentacion
</commit_message>
<xml_diff>
--- a/Presentacion/El principio de la sabiduría es el temor.pptx
+++ b/Presentacion/El principio de la sabiduría es el temor.pptx
@@ -16,9 +16,11 @@
     <p:sldId id="264" r:id="rId10"/>
     <p:sldId id="265" r:id="rId11"/>
     <p:sldId id="311" r:id="rId12"/>
-    <p:sldId id="301" r:id="rId13"/>
-    <p:sldId id="302" r:id="rId14"/>
-    <p:sldId id="310" r:id="rId15"/>
+    <p:sldId id="312" r:id="rId13"/>
+    <p:sldId id="313" r:id="rId14"/>
+    <p:sldId id="301" r:id="rId15"/>
+    <p:sldId id="302" r:id="rId16"/>
+    <p:sldId id="310" r:id="rId17"/>
   </p:sldIdLst>
   <p:sldSz cx="12192000" cy="6858000"/>
   <p:notesSz cx="6858000" cy="9144000"/>
@@ -313,7 +315,7 @@
           <a:p>
             <a:fld id="{F2C0BB60-5A00-4D40-9B24-E1B8CD33CB7F}" type="datetimeFigureOut">
               <a:rPr lang="en-US" smtClean="0"/>
-              <a:t>11/22/2020</a:t>
+              <a:t>11/23/2020</a:t>
             </a:fld>
             <a:endParaRPr lang="en-US"/>
           </a:p>
@@ -651,7 +653,7 @@
           <a:p>
             <a:fld id="{F2C0BB60-5A00-4D40-9B24-E1B8CD33CB7F}" type="datetimeFigureOut">
               <a:rPr lang="en-US" smtClean="0"/>
-              <a:t>11/22/2020</a:t>
+              <a:t>11/23/2020</a:t>
             </a:fld>
             <a:endParaRPr lang="en-US"/>
           </a:p>
@@ -1052,7 +1054,7 @@
           <a:p>
             <a:fld id="{F2C0BB60-5A00-4D40-9B24-E1B8CD33CB7F}" type="datetimeFigureOut">
               <a:rPr lang="en-US" smtClean="0"/>
-              <a:t>11/22/2020</a:t>
+              <a:t>11/23/2020</a:t>
             </a:fld>
             <a:endParaRPr lang="en-US"/>
           </a:p>
@@ -1388,7 +1390,7 @@
           <a:p>
             <a:fld id="{F2C0BB60-5A00-4D40-9B24-E1B8CD33CB7F}" type="datetimeFigureOut">
               <a:rPr lang="en-US" smtClean="0"/>
-              <a:t>11/22/2020</a:t>
+              <a:t>11/23/2020</a:t>
             </a:fld>
             <a:endParaRPr lang="en-US"/>
           </a:p>
@@ -1708,7 +1710,7 @@
           <a:p>
             <a:fld id="{F2C0BB60-5A00-4D40-9B24-E1B8CD33CB7F}" type="datetimeFigureOut">
               <a:rPr lang="en-US" smtClean="0"/>
-              <a:t>11/22/2020</a:t>
+              <a:t>11/23/2020</a:t>
             </a:fld>
             <a:endParaRPr lang="en-US"/>
           </a:p>
@@ -2104,7 +2106,7 @@
           <a:p>
             <a:fld id="{F2C0BB60-5A00-4D40-9B24-E1B8CD33CB7F}" type="datetimeFigureOut">
               <a:rPr lang="en-US" smtClean="0"/>
-              <a:t>11/22/2020</a:t>
+              <a:t>11/23/2020</a:t>
             </a:fld>
             <a:endParaRPr lang="en-US"/>
           </a:p>
@@ -2361,7 +2363,7 @@
           <a:p>
             <a:fld id="{F2C0BB60-5A00-4D40-9B24-E1B8CD33CB7F}" type="datetimeFigureOut">
               <a:rPr lang="en-US" smtClean="0"/>
-              <a:t>11/22/2020</a:t>
+              <a:t>11/23/2020</a:t>
             </a:fld>
             <a:endParaRPr lang="en-US"/>
           </a:p>
@@ -2623,7 +2625,7 @@
           <a:p>
             <a:fld id="{F2C0BB60-5A00-4D40-9B24-E1B8CD33CB7F}" type="datetimeFigureOut">
               <a:rPr lang="en-US" smtClean="0"/>
-              <a:t>11/22/2020</a:t>
+              <a:t>11/23/2020</a:t>
             </a:fld>
             <a:endParaRPr lang="en-US"/>
           </a:p>
@@ -2885,7 +2887,7 @@
           <a:p>
             <a:fld id="{F2C0BB60-5A00-4D40-9B24-E1B8CD33CB7F}" type="datetimeFigureOut">
               <a:rPr lang="en-US" smtClean="0"/>
-              <a:t>11/22/2020</a:t>
+              <a:t>11/23/2020</a:t>
             </a:fld>
             <a:endParaRPr lang="en-US"/>
           </a:p>
@@ -3214,7 +3216,7 @@
           <a:p>
             <a:fld id="{F2C0BB60-5A00-4D40-9B24-E1B8CD33CB7F}" type="datetimeFigureOut">
               <a:rPr lang="en-US" smtClean="0"/>
-              <a:t>11/22/2020</a:t>
+              <a:t>11/23/2020</a:t>
             </a:fld>
             <a:endParaRPr lang="en-US"/>
           </a:p>
@@ -3537,7 +3539,7 @@
           <a:p>
             <a:fld id="{F2C0BB60-5A00-4D40-9B24-E1B8CD33CB7F}" type="datetimeFigureOut">
               <a:rPr lang="en-US" smtClean="0"/>
-              <a:t>11/22/2020</a:t>
+              <a:t>11/23/2020</a:t>
             </a:fld>
             <a:endParaRPr lang="en-US"/>
           </a:p>
@@ -3994,7 +3996,7 @@
           <a:p>
             <a:fld id="{F2C0BB60-5A00-4D40-9B24-E1B8CD33CB7F}" type="datetimeFigureOut">
               <a:rPr lang="en-US" smtClean="0"/>
-              <a:t>11/22/2020</a:t>
+              <a:t>11/23/2020</a:t>
             </a:fld>
             <a:endParaRPr lang="en-US"/>
           </a:p>
@@ -4199,7 +4201,7 @@
           <a:p>
             <a:fld id="{F2C0BB60-5A00-4D40-9B24-E1B8CD33CB7F}" type="datetimeFigureOut">
               <a:rPr lang="en-US" smtClean="0"/>
-              <a:t>11/22/2020</a:t>
+              <a:t>11/23/2020</a:t>
             </a:fld>
             <a:endParaRPr lang="en-US"/>
           </a:p>
@@ -4376,7 +4378,7 @@
           <a:p>
             <a:fld id="{F2C0BB60-5A00-4D40-9B24-E1B8CD33CB7F}" type="datetimeFigureOut">
               <a:rPr lang="en-US" smtClean="0"/>
-              <a:t>11/22/2020</a:t>
+              <a:t>11/23/2020</a:t>
             </a:fld>
             <a:endParaRPr lang="en-US"/>
           </a:p>
@@ -4709,7 +4711,7 @@
           <a:p>
             <a:fld id="{F2C0BB60-5A00-4D40-9B24-E1B8CD33CB7F}" type="datetimeFigureOut">
               <a:rPr lang="en-US" smtClean="0"/>
-              <a:t>11/22/2020</a:t>
+              <a:t>11/23/2020</a:t>
             </a:fld>
             <a:endParaRPr lang="en-US"/>
           </a:p>
@@ -5054,7 +5056,7 @@
           <a:p>
             <a:fld id="{F2C0BB60-5A00-4D40-9B24-E1B8CD33CB7F}" type="datetimeFigureOut">
               <a:rPr lang="en-US" smtClean="0"/>
-              <a:t>11/22/2020</a:t>
+              <a:t>11/23/2020</a:t>
             </a:fld>
             <a:endParaRPr lang="en-US"/>
           </a:p>
@@ -7171,7 +7173,7 @@
           <a:p>
             <a:fld id="{F2C0BB60-5A00-4D40-9B24-E1B8CD33CB7F}" type="datetimeFigureOut">
               <a:rPr lang="en-US" smtClean="0"/>
-              <a:t>11/22/2020</a:t>
+              <a:t>11/23/2020</a:t>
             </a:fld>
             <a:endParaRPr lang="en-US"/>
           </a:p>
@@ -7767,7 +7769,7 @@
         </p:nvSpPr>
         <p:spPr>
           <a:xfrm>
-            <a:off x="1640156" y="362853"/>
+            <a:off x="1640154" y="104474"/>
             <a:ext cx="8911687" cy="615715"/>
           </a:xfrm>
         </p:spPr>
@@ -7779,8 +7781,8 @@
           <a:p>
             <a:pPr algn="ctr"/>
             <a:r>
-              <a:rPr lang="es-NI" b="1" dirty="0"/>
-              <a:t>MARCO </a:t>
+              <a:rPr lang="es-NI" b="1" dirty="0" smtClean="0"/>
+              <a:t>ESQUEMA DEL MARCO </a:t>
             </a:r>
             <a:r>
               <a:rPr lang="es-NI" b="1" dirty="0" smtClean="0"/>
@@ -7812,7 +7814,7 @@
         </p:blipFill>
         <p:spPr>
           <a:xfrm>
-            <a:off x="2267728" y="2050232"/>
+            <a:off x="2254665" y="1746557"/>
             <a:ext cx="2708355" cy="2708355"/>
           </a:xfrm>
           <a:prstGeom prst="rect">
@@ -7828,8 +7830,8 @@
         </p:nvSpPr>
         <p:spPr>
           <a:xfrm>
-            <a:off x="1640156" y="4919008"/>
-            <a:ext cx="4215212" cy="1200329"/>
+            <a:off x="1640154" y="4723065"/>
+            <a:ext cx="4215212" cy="1524007"/>
           </a:xfrm>
           <a:prstGeom prst="rect">
             <a:avLst/>
@@ -7849,6 +7851,52 @@
                 <a:spcPts val="0"/>
               </a:spcAft>
             </a:pPr>
+            <a:r>
+              <a:rPr lang="es-NI" sz="1600" dirty="0" smtClean="0">
+                <a:ln w="0"/>
+                <a:solidFill>
+                  <a:schemeClr val="accent1"/>
+                </a:solidFill>
+                <a:effectLst>
+                  <a:outerShdw blurRad="38100" dist="25400" dir="5400000" algn="ctr" rotWithShape="0">
+                    <a:srgbClr val="6E747A">
+                      <a:alpha val="43000"/>
+                    </a:srgbClr>
+                  </a:outerShdw>
+                </a:effectLst>
+                <a:latin typeface="Arial" panose="020B0604020202020204" pitchFamily="34" charset="0"/>
+                <a:ea typeface="Arial" panose="020B0604020202020204" pitchFamily="34" charset="0"/>
+              </a:rPr>
+              <a:t>NIVEL MUNDIAL</a:t>
+            </a:r>
+          </a:p>
+          <a:p>
+            <a:pPr algn="just">
+              <a:lnSpc>
+                <a:spcPct val="150000"/>
+              </a:lnSpc>
+              <a:spcAft>
+                <a:spcPts val="0"/>
+              </a:spcAft>
+            </a:pPr>
+            <a:r>
+              <a:rPr lang="es-NI" sz="1600" dirty="0" smtClean="0">
+                <a:ln w="0"/>
+                <a:solidFill>
+                  <a:schemeClr val="accent1"/>
+                </a:solidFill>
+                <a:effectLst>
+                  <a:outerShdw blurRad="38100" dist="25400" dir="5400000" algn="ctr" rotWithShape="0">
+                    <a:srgbClr val="6E747A">
+                      <a:alpha val="43000"/>
+                    </a:srgbClr>
+                  </a:outerShdw>
+                </a:effectLst>
+                <a:latin typeface="Arial" panose="020B0604020202020204" pitchFamily="34" charset="0"/>
+                <a:ea typeface="Arial" panose="020B0604020202020204" pitchFamily="34" charset="0"/>
+              </a:rPr>
+              <a:t>Los </a:t>
+            </a:r>
             <a:r>
               <a:rPr lang="es-NI" sz="1600" dirty="0">
                 <a:ln w="0"/>
@@ -7865,7 +7913,7 @@
                 <a:latin typeface="Arial" panose="020B0604020202020204" pitchFamily="34" charset="0"/>
                 <a:ea typeface="Arial" panose="020B0604020202020204" pitchFamily="34" charset="0"/>
               </a:rPr>
-              <a:t>Los sistemas orientados al control de registros de datos, son muy populares desde hace ya varios años a nivel </a:t>
+              <a:t>sistemas orientados al control de registros de datos, son muy populares desde hace ya varios años a nivel </a:t>
             </a:r>
             <a:r>
               <a:rPr lang="es-NI" sz="1600" dirty="0" smtClean="0">
@@ -7925,7 +7973,7 @@
         </p:blipFill>
         <p:spPr>
           <a:xfrm>
-            <a:off x="8147163" y="2050232"/>
+            <a:off x="8147161" y="1746557"/>
             <a:ext cx="2404680" cy="2404680"/>
           </a:xfrm>
           <a:prstGeom prst="rect">
@@ -7941,8 +7989,8 @@
         </p:nvSpPr>
         <p:spPr>
           <a:xfrm>
-            <a:off x="7438561" y="4919008"/>
-            <a:ext cx="3821883" cy="1938992"/>
+            <a:off x="7438559" y="4602703"/>
+            <a:ext cx="3821883" cy="2262671"/>
           </a:xfrm>
           <a:prstGeom prst="rect">
             <a:avLst/>
@@ -7962,6 +8010,52 @@
                 <a:spcPts val="0"/>
               </a:spcAft>
             </a:pPr>
+            <a:r>
+              <a:rPr lang="es-NI" sz="1600" dirty="0" smtClean="0">
+                <a:ln w="0"/>
+                <a:solidFill>
+                  <a:schemeClr val="accent1"/>
+                </a:solidFill>
+                <a:effectLst>
+                  <a:outerShdw blurRad="38100" dist="25400" dir="5400000" algn="ctr" rotWithShape="0">
+                    <a:srgbClr val="6E747A">
+                      <a:alpha val="43000"/>
+                    </a:srgbClr>
+                  </a:outerShdw>
+                </a:effectLst>
+                <a:latin typeface="Arial" panose="020B0604020202020204" pitchFamily="34" charset="0"/>
+                <a:ea typeface="Arial" panose="020B0604020202020204" pitchFamily="34" charset="0"/>
+              </a:rPr>
+              <a:t>NIVEL NACIONAL</a:t>
+            </a:r>
+          </a:p>
+          <a:p>
+            <a:pPr algn="just">
+              <a:lnSpc>
+                <a:spcPct val="150000"/>
+              </a:lnSpc>
+              <a:spcAft>
+                <a:spcPts val="0"/>
+              </a:spcAft>
+            </a:pPr>
+            <a:r>
+              <a:rPr lang="es-NI" sz="1600" dirty="0" smtClean="0">
+                <a:ln w="0"/>
+                <a:solidFill>
+                  <a:schemeClr val="accent1"/>
+                </a:solidFill>
+                <a:effectLst>
+                  <a:outerShdw blurRad="38100" dist="25400" dir="5400000" algn="ctr" rotWithShape="0">
+                    <a:srgbClr val="6E747A">
+                      <a:alpha val="43000"/>
+                    </a:srgbClr>
+                  </a:outerShdw>
+                </a:effectLst>
+                <a:latin typeface="Arial" panose="020B0604020202020204" pitchFamily="34" charset="0"/>
+                <a:ea typeface="Arial" panose="020B0604020202020204" pitchFamily="34" charset="0"/>
+              </a:rPr>
+              <a:t>En </a:t>
+            </a:r>
             <a:r>
               <a:rPr lang="es-NI" sz="1600" dirty="0">
                 <a:ln w="0"/>
@@ -7978,25 +8072,7 @@
                 <a:latin typeface="Arial" panose="020B0604020202020204" pitchFamily="34" charset="0"/>
                 <a:ea typeface="Arial" panose="020B0604020202020204" pitchFamily="34" charset="0"/>
               </a:rPr>
-              <a:t>En Nicaragua existen universidades que tiene ya más de 200 años y éstas han desarrollado controles de registros orientados a las diferentes áreas de sus </a:t>
-            </a:r>
-            <a:r>
-              <a:rPr lang="es-NI" sz="1600" dirty="0">
-                <a:ln w="0"/>
-                <a:solidFill>
-                  <a:schemeClr val="accent1"/>
-                </a:solidFill>
-                <a:effectLst>
-                  <a:outerShdw blurRad="38100" dist="25400" dir="5400000" algn="ctr" rotWithShape="0">
-                    <a:srgbClr val="6E747A">
-                      <a:alpha val="43000"/>
-                    </a:srgbClr>
-                  </a:outerShdw>
-                </a:effectLst>
-                <a:latin typeface="Arial" panose="020B0604020202020204" pitchFamily="34" charset="0"/>
-                <a:ea typeface="Arial" panose="020B0604020202020204" pitchFamily="34" charset="0"/>
-              </a:rPr>
-              <a:t>campus…</a:t>
+              <a:t>Nicaragua existen universidades que tiene ya más de 200 años y éstas han desarrollado controles de registros orientados a las diferentes áreas de sus campus…</a:t>
             </a:r>
             <a:endParaRPr lang="en-US" sz="1600" dirty="0">
               <a:ln w="0"/>
@@ -8026,8 +8102,8 @@
         </p:nvSpPr>
         <p:spPr>
           <a:xfrm>
-            <a:off x="1640155" y="1184285"/>
-            <a:ext cx="8911687" cy="615715"/>
+            <a:off x="1410788" y="1056847"/>
+            <a:ext cx="9141053" cy="832964"/>
           </a:xfrm>
           <a:prstGeom prst="rect">
             <a:avLst/>
@@ -8115,10 +8191,10 @@
           <a:p>
             <a:pPr algn="ctr"/>
             <a:r>
-              <a:rPr lang="es-NI" sz="2800" b="1" dirty="0" smtClean="0"/>
+              <a:rPr lang="es-NI" sz="2400" b="1" dirty="0" smtClean="0"/>
               <a:t>CRITERIOS GENERALES</a:t>
             </a:r>
-            <a:endParaRPr lang="en-US" sz="2800" dirty="0"/>
+            <a:endParaRPr lang="en-US" sz="2400" dirty="0"/>
           </a:p>
         </p:txBody>
       </p:sp>
@@ -8183,8 +8259,8 @@
           <a:p>
             <a:pPr algn="ctr"/>
             <a:r>
-              <a:rPr lang="es-NI" b="1" dirty="0"/>
-              <a:t>MARCO </a:t>
+              <a:rPr lang="es-NI" b="1" dirty="0" smtClean="0"/>
+              <a:t>ESQUEMA DEL MARCO </a:t>
             </a:r>
             <a:r>
               <a:rPr lang="es-NI" b="1" dirty="0" smtClean="0"/>
@@ -8202,8 +8278,8 @@
         </p:nvSpPr>
         <p:spPr>
           <a:xfrm>
-            <a:off x="1640156" y="4070169"/>
-            <a:ext cx="4487928" cy="2262671"/>
+            <a:off x="1640156" y="4044043"/>
+            <a:ext cx="4487928" cy="2677656"/>
           </a:xfrm>
           <a:prstGeom prst="rect">
             <a:avLst/>
@@ -8220,6 +8296,49 @@
                 <a:spcPct val="150000"/>
               </a:lnSpc>
             </a:pPr>
+            <a:r>
+              <a:rPr lang="es-NI" sz="1600" dirty="0" smtClean="0">
+                <a:ln w="0"/>
+                <a:solidFill>
+                  <a:schemeClr val="accent1"/>
+                </a:solidFill>
+                <a:effectLst>
+                  <a:outerShdw blurRad="38100" dist="25400" dir="5400000" algn="ctr" rotWithShape="0">
+                    <a:srgbClr val="6E747A">
+                      <a:alpha val="43000"/>
+                    </a:srgbClr>
+                  </a:outerShdw>
+                </a:effectLst>
+                <a:latin typeface="Arial" panose="020B0604020202020204" pitchFamily="34" charset="0"/>
+                <a:ea typeface="Arial" panose="020B0604020202020204" pitchFamily="34" charset="0"/>
+              </a:rPr>
+              <a:t>NIVEL LOCAL</a:t>
+            </a:r>
+          </a:p>
+          <a:p>
+            <a:pPr algn="just">
+              <a:lnSpc>
+                <a:spcPct val="150000"/>
+              </a:lnSpc>
+            </a:pPr>
+            <a:r>
+              <a:rPr lang="es-NI" sz="1600" dirty="0" smtClean="0">
+                <a:ln w="0"/>
+                <a:solidFill>
+                  <a:schemeClr val="accent1"/>
+                </a:solidFill>
+                <a:effectLst>
+                  <a:outerShdw blurRad="38100" dist="25400" dir="5400000" algn="ctr" rotWithShape="0">
+                    <a:srgbClr val="6E747A">
+                      <a:alpha val="43000"/>
+                    </a:srgbClr>
+                  </a:outerShdw>
+                </a:effectLst>
+                <a:latin typeface="Arial" panose="020B0604020202020204" pitchFamily="34" charset="0"/>
+                <a:ea typeface="Arial" panose="020B0604020202020204" pitchFamily="34" charset="0"/>
+              </a:rPr>
+              <a:t>Universidad </a:t>
+            </a:r>
             <a:r>
               <a:rPr lang="es-NI" sz="1600" dirty="0">
                 <a:ln w="0"/>
@@ -8236,7 +8355,43 @@
                 <a:latin typeface="Arial" panose="020B0604020202020204" pitchFamily="34" charset="0"/>
                 <a:ea typeface="Arial" panose="020B0604020202020204" pitchFamily="34" charset="0"/>
               </a:rPr>
-              <a:t>Universidad Martín Lutero a nivel nacional aún no cuenta con alguna plataforma que pueda satisfacer las necesidades informativas y de gestión administrativa de nuestra comunidad universitaria, por lo que es menester iniciar a construirla.</a:t>
+              <a:t>Martín Lutero </a:t>
+            </a:r>
+            <a:r>
+              <a:rPr lang="es-NI" sz="1600" dirty="0" smtClean="0">
+                <a:ln w="0"/>
+                <a:solidFill>
+                  <a:schemeClr val="accent1"/>
+                </a:solidFill>
+                <a:effectLst>
+                  <a:outerShdw blurRad="38100" dist="25400" dir="5400000" algn="ctr" rotWithShape="0">
+                    <a:srgbClr val="6E747A">
+                      <a:alpha val="43000"/>
+                    </a:srgbClr>
+                  </a:outerShdw>
+                </a:effectLst>
+                <a:latin typeface="Arial" panose="020B0604020202020204" pitchFamily="34" charset="0"/>
+                <a:ea typeface="Arial" panose="020B0604020202020204" pitchFamily="34" charset="0"/>
+              </a:rPr>
+              <a:t>aún </a:t>
+            </a:r>
+            <a:r>
+              <a:rPr lang="es-NI" sz="1600" dirty="0">
+                <a:ln w="0"/>
+                <a:solidFill>
+                  <a:schemeClr val="accent1"/>
+                </a:solidFill>
+                <a:effectLst>
+                  <a:outerShdw blurRad="38100" dist="25400" dir="5400000" algn="ctr" rotWithShape="0">
+                    <a:srgbClr val="6E747A">
+                      <a:alpha val="43000"/>
+                    </a:srgbClr>
+                  </a:outerShdw>
+                </a:effectLst>
+                <a:latin typeface="Arial" panose="020B0604020202020204" pitchFamily="34" charset="0"/>
+                <a:ea typeface="Arial" panose="020B0604020202020204" pitchFamily="34" charset="0"/>
+              </a:rPr>
+              <a:t>no cuenta con alguna plataforma que pueda satisfacer las necesidades informativas y de gestión administrativa de nuestra comunidad universitaria, por lo que es menester iniciar a construirla.</a:t>
             </a:r>
             <a:endParaRPr lang="en-US" sz="1600" dirty="0">
               <a:ln w="0"/>
@@ -8264,8 +8419,8 @@
         </p:nvSpPr>
         <p:spPr>
           <a:xfrm>
-            <a:off x="7230014" y="4070169"/>
-            <a:ext cx="4448639" cy="2473306"/>
+            <a:off x="7230014" y="4017917"/>
+            <a:ext cx="4448639" cy="2819554"/>
           </a:xfrm>
           <a:prstGeom prst="rect">
             <a:avLst/>
@@ -8276,6 +8431,31 @@
             <a:spAutoFit/>
           </a:bodyPr>
           <a:lstStyle/>
+          <a:p>
+            <a:pPr algn="just">
+              <a:lnSpc>
+                <a:spcPct val="150000"/>
+              </a:lnSpc>
+            </a:pPr>
+            <a:r>
+              <a:rPr lang="es-NI" sz="1500" dirty="0" smtClean="0">
+                <a:ln w="0"/>
+                <a:solidFill>
+                  <a:schemeClr val="accent1"/>
+                </a:solidFill>
+                <a:effectLst>
+                  <a:outerShdw blurRad="38100" dist="25400" dir="5400000" algn="ctr" rotWithShape="0">
+                    <a:srgbClr val="6E747A">
+                      <a:alpha val="43000"/>
+                    </a:srgbClr>
+                  </a:outerShdw>
+                </a:effectLst>
+                <a:latin typeface="Arial" panose="020B0604020202020204" pitchFamily="34" charset="0"/>
+                <a:ea typeface="Arial" panose="020B0604020202020204" pitchFamily="34" charset="0"/>
+              </a:rPr>
+              <a:t>NIVEL ESPECÍFICO</a:t>
+            </a:r>
+          </a:p>
           <a:p>
             <a:pPr algn="just">
               <a:lnSpc>
@@ -8593,8 +8773,39 @@
         </p:nvSpPr>
         <p:spPr>
           <a:xfrm>
-            <a:off x="1549066" y="986589"/>
-            <a:ext cx="10507578" cy="5414211"/>
+            <a:off x="1640156" y="362853"/>
+            <a:ext cx="8911687" cy="615715"/>
+          </a:xfrm>
+        </p:spPr>
+        <p:txBody>
+          <a:bodyPr>
+            <a:normAutofit fontScale="90000"/>
+          </a:bodyPr>
+          <a:lstStyle/>
+          <a:p>
+            <a:pPr algn="ctr"/>
+            <a:r>
+              <a:rPr lang="es-NI" b="1" dirty="0" smtClean="0"/>
+              <a:t>METODOLOGÍA</a:t>
+            </a:r>
+            <a:endParaRPr lang="en-US" dirty="0"/>
+          </a:p>
+        </p:txBody>
+      </p:sp>
+      <p:sp>
+        <p:nvSpPr>
+          <p:cNvPr id="8" name="Marcador de contenido 2"/>
+          <p:cNvSpPr>
+            <a:spLocks noGrp="1"/>
+          </p:cNvSpPr>
+          <p:nvPr>
+            <p:ph idx="1"/>
+          </p:nvPr>
+        </p:nvSpPr>
+        <p:spPr>
+          <a:xfrm>
+            <a:off x="1640156" y="978568"/>
+            <a:ext cx="9751631" cy="5879432"/>
           </a:xfrm>
         </p:spPr>
         <p:txBody>
@@ -8603,154 +8814,187 @@
           </a:bodyPr>
           <a:lstStyle/>
           <a:p>
-            <a:r>
-              <a:rPr lang="es-NI" sz="2000" dirty="0" smtClean="0">
+            <a:pPr>
+              <a:lnSpc>
+                <a:spcPct val="150000"/>
+              </a:lnSpc>
+            </a:pPr>
+            <a:r>
+              <a:rPr lang="es-NI" dirty="0">
                 <a:latin typeface="Arial" panose="020B0604020202020204" pitchFamily="34" charset="0"/>
                 <a:cs typeface="Arial" panose="020B0604020202020204" pitchFamily="34" charset="0"/>
               </a:rPr>
-              <a:t>Concluimos </a:t>
-            </a:r>
-            <a:r>
-              <a:rPr lang="es-NI" sz="2000" dirty="0">
+              <a:t>Al hablar de la implementación de nuestro proyecto nos enfocamos en el campo administrativo, en el cual deseamos optimizar los procesos de control de notas, por el cual deducimos que esto </a:t>
+            </a:r>
+            <a:r>
+              <a:rPr lang="es-NI" dirty="0" smtClean="0">
                 <a:latin typeface="Arial" panose="020B0604020202020204" pitchFamily="34" charset="0"/>
                 <a:cs typeface="Arial" panose="020B0604020202020204" pitchFamily="34" charset="0"/>
               </a:rPr>
-              <a:t>que el sistema de registro de notas fue una excelente experiencia y un buen desafío para nuestros límites, nuestras indagaciones sobre apropiarnos de la forma de trabajo tradicional que realiza el área de registro académico, fue de mucha ayuda ya que de esta forma pudimos tener una visión más clara del objetivo que debíamos alcanzar, ya que pudimos observar la dificultad y lo tedioso que resulta manejar ese gran volumen de datos.</a:t>
-            </a:r>
-            <a:r>
-              <a:rPr lang="en-US" sz="2000" dirty="0">
+              <a:t>mejorará </a:t>
+            </a:r>
+            <a:r>
+              <a:rPr lang="es-NI" dirty="0">
                 <a:latin typeface="Arial" panose="020B0604020202020204" pitchFamily="34" charset="0"/>
                 <a:cs typeface="Arial" panose="020B0604020202020204" pitchFamily="34" charset="0"/>
               </a:rPr>
-              <a:t/>
-            </a:r>
-            <a:br>
-              <a:rPr lang="en-US" sz="2000" dirty="0">
+              <a:t>de gran manera la calidad de los procesos mencionados y ayudara a llevar un mejor control de lo anteriormente </a:t>
+            </a:r>
+            <a:r>
+              <a:rPr lang="es-NI" dirty="0" smtClean="0">
                 <a:latin typeface="Arial" panose="020B0604020202020204" pitchFamily="34" charset="0"/>
                 <a:cs typeface="Arial" panose="020B0604020202020204" pitchFamily="34" charset="0"/>
               </a:rPr>
-            </a:br>
-            <a:r>
-              <a:rPr lang="es-NI" sz="2000" dirty="0">
-                <a:latin typeface="Arial" panose="020B0604020202020204" pitchFamily="34" charset="0"/>
-                <a:cs typeface="Arial" panose="020B0604020202020204" pitchFamily="34" charset="0"/>
-              </a:rPr>
-              <a:t> </a:t>
-            </a:r>
-            <a:r>
-              <a:rPr lang="en-US" sz="2000" dirty="0">
-                <a:latin typeface="Arial" panose="020B0604020202020204" pitchFamily="34" charset="0"/>
-                <a:cs typeface="Arial" panose="020B0604020202020204" pitchFamily="34" charset="0"/>
-              </a:rPr>
-              <a:t/>
-            </a:r>
-            <a:br>
-              <a:rPr lang="en-US" sz="2000" dirty="0">
-                <a:latin typeface="Arial" panose="020B0604020202020204" pitchFamily="34" charset="0"/>
-                <a:cs typeface="Arial" panose="020B0604020202020204" pitchFamily="34" charset="0"/>
-              </a:rPr>
-            </a:br>
-            <a:r>
-              <a:rPr lang="es-NI" sz="2000" dirty="0">
-                <a:latin typeface="Arial" panose="020B0604020202020204" pitchFamily="34" charset="0"/>
-                <a:cs typeface="Arial" panose="020B0604020202020204" pitchFamily="34" charset="0"/>
-              </a:rPr>
-              <a:t>Encontramos que el personal administrativo como los docentes hacen un esfuerzo muy grande por garantizar de manera física (escrita en formato de notas) los resultados académicos de los estudiantes de cada corte evaluativo.</a:t>
-            </a:r>
-            <a:r>
-              <a:rPr lang="en-US" sz="2000" dirty="0">
-                <a:latin typeface="Arial" panose="020B0604020202020204" pitchFamily="34" charset="0"/>
-                <a:cs typeface="Arial" panose="020B0604020202020204" pitchFamily="34" charset="0"/>
-              </a:rPr>
-              <a:t/>
-            </a:r>
-            <a:br>
-              <a:rPr lang="en-US" sz="2000" dirty="0">
-                <a:latin typeface="Arial" panose="020B0604020202020204" pitchFamily="34" charset="0"/>
-                <a:cs typeface="Arial" panose="020B0604020202020204" pitchFamily="34" charset="0"/>
-              </a:rPr>
-            </a:br>
-            <a:r>
-              <a:rPr lang="es-NI" sz="2000" dirty="0">
-                <a:latin typeface="Arial" panose="020B0604020202020204" pitchFamily="34" charset="0"/>
-                <a:cs typeface="Arial" panose="020B0604020202020204" pitchFamily="34" charset="0"/>
-              </a:rPr>
-              <a:t> </a:t>
-            </a:r>
-            <a:r>
-              <a:rPr lang="en-US" sz="2000" dirty="0">
-                <a:latin typeface="Arial" panose="020B0604020202020204" pitchFamily="34" charset="0"/>
-                <a:cs typeface="Arial" panose="020B0604020202020204" pitchFamily="34" charset="0"/>
-              </a:rPr>
-              <a:t/>
-            </a:r>
-            <a:br>
-              <a:rPr lang="en-US" sz="2000" dirty="0">
-                <a:latin typeface="Arial" panose="020B0604020202020204" pitchFamily="34" charset="0"/>
-                <a:cs typeface="Arial" panose="020B0604020202020204" pitchFamily="34" charset="0"/>
-              </a:rPr>
-            </a:br>
-            <a:r>
-              <a:rPr lang="es-NI" sz="2000" dirty="0">
-                <a:latin typeface="Arial" panose="020B0604020202020204" pitchFamily="34" charset="0"/>
-                <a:cs typeface="Arial" panose="020B0604020202020204" pitchFamily="34" charset="0"/>
-              </a:rPr>
-              <a:t>Creado el sistema en línea “SIS Universidad”, para que los docentes puedan realizar el registro de notas de los alumnos, inclusive desde su casa, en caso de no tener los medios tecnológicos, pueden hacerlo desde las instalaciones de la universidad o en último caso, pueden entregar su formato en físico para que el personal de registro académico pueda ingresar las notas al sistema. Los reportes de notas se pueden generar de forma inmediata por los usuarios administrativos que le consulten</a:t>
-            </a:r>
-            <a:r>
-              <a:rPr lang="es-NI" sz="2000" dirty="0" smtClean="0">
-                <a:latin typeface="Arial" panose="020B0604020202020204" pitchFamily="34" charset="0"/>
-                <a:cs typeface="Arial" panose="020B0604020202020204" pitchFamily="34" charset="0"/>
-              </a:rPr>
+              <a:t>expuesto.</a:t>
+            </a:r>
+          </a:p>
+          <a:p>
+            <a:pPr marL="0" indent="0">
+              <a:lnSpc>
+                <a:spcPct val="150000"/>
+              </a:lnSpc>
+              <a:buNone/>
+            </a:pPr>
+            <a:endParaRPr lang="en-US" sz="100" dirty="0"/>
+          </a:p>
+          <a:p>
+            <a:r>
+              <a:rPr lang="es-NI" b="1" dirty="0"/>
+              <a:t>Tipo de Investigación</a:t>
+            </a:r>
+            <a:endParaRPr lang="en-US" b="1" dirty="0"/>
+          </a:p>
+          <a:p>
+            <a:pPr marL="0" indent="0">
+              <a:buNone/>
+            </a:pPr>
+            <a:r>
+              <a:rPr lang="es-NI" dirty="0"/>
+              <a:t>El tipo de investigación es Mixta</a:t>
+            </a:r>
+            <a:endParaRPr lang="en-US" dirty="0"/>
+          </a:p>
+          <a:p>
+            <a:pPr marL="0" indent="0">
+              <a:buNone/>
+            </a:pPr>
+            <a:r>
+              <a:rPr lang="es-NI" dirty="0"/>
+              <a:t>Por la naturaleza es de tipo exploratorio y descriptivo</a:t>
+            </a:r>
+            <a:r>
+              <a:rPr lang="es-NI" dirty="0" smtClean="0"/>
               <a:t>.</a:t>
             </a:r>
-            <a:r>
-              <a:rPr lang="es-NI" sz="1400" dirty="0" smtClean="0">
-                <a:latin typeface="Arial" panose="020B0604020202020204" pitchFamily="34" charset="0"/>
-                <a:cs typeface="Arial" panose="020B0604020202020204" pitchFamily="34" charset="0"/>
-              </a:rPr>
-              <a:t> </a:t>
-            </a:r>
-            <a:endParaRPr lang="en-US" sz="1500" dirty="0">
-              <a:latin typeface="Arial" panose="020B0604020202020204" pitchFamily="34" charset="0"/>
-              <a:cs typeface="Arial" panose="020B0604020202020204" pitchFamily="34" charset="0"/>
-            </a:endParaRPr>
-          </a:p>
-        </p:txBody>
-      </p:sp>
-      <p:sp>
-        <p:nvSpPr>
-          <p:cNvPr id="3" name="Rectángulo 2"/>
-          <p:cNvSpPr/>
-          <p:nvPr/>
-        </p:nvSpPr>
-        <p:spPr>
-          <a:xfrm>
-            <a:off x="1549066" y="158234"/>
-            <a:ext cx="2927404" cy="523220"/>
-          </a:xfrm>
-          <a:prstGeom prst="rect">
-            <a:avLst/>
-          </a:prstGeom>
-        </p:spPr>
-        <p:txBody>
-          <a:bodyPr wrap="none">
-            <a:spAutoFit/>
-          </a:bodyPr>
-          <a:lstStyle/>
-          <a:p>
-            <a:r>
-              <a:rPr lang="es-NI" sz="2800" b="1" dirty="0" smtClean="0"/>
-              <a:t>CONCLUSIONES</a:t>
-            </a:r>
-            <a:endParaRPr lang="en-US" sz="2800" dirty="0"/>
+          </a:p>
+          <a:p>
+            <a:pPr marL="0" indent="0">
+              <a:buNone/>
+            </a:pPr>
+            <a:endParaRPr lang="en-US" sz="800" dirty="0"/>
+          </a:p>
+          <a:p>
+            <a:r>
+              <a:rPr lang="es-NI" b="1" dirty="0"/>
+              <a:t>Métodos</a:t>
+            </a:r>
+            <a:endParaRPr lang="en-US" b="1" dirty="0"/>
+          </a:p>
+          <a:p>
+            <a:pPr marL="0" indent="0">
+              <a:buNone/>
+            </a:pPr>
+            <a:r>
+              <a:rPr lang="es-NI" dirty="0"/>
+              <a:t>En el presente proyecto, se ha utilizado diversos métodos para las prácticas de </a:t>
+            </a:r>
+            <a:r>
+              <a:rPr lang="es-NI" dirty="0" smtClean="0"/>
+              <a:t>investigación, </a:t>
+            </a:r>
+            <a:r>
+              <a:rPr lang="es-NI" dirty="0"/>
+              <a:t>e</a:t>
+            </a:r>
+            <a:r>
+              <a:rPr lang="es-NI" dirty="0" smtClean="0"/>
+              <a:t>n </a:t>
+            </a:r>
+            <a:r>
+              <a:rPr lang="es-NI" dirty="0"/>
+              <a:t>resumen, los métodos </a:t>
+            </a:r>
+            <a:r>
+              <a:rPr lang="es-NI" dirty="0" smtClean="0"/>
+              <a:t>empleados fueron:</a:t>
+            </a:r>
+            <a:endParaRPr lang="en-US" dirty="0"/>
+          </a:p>
+          <a:p>
+            <a:pPr marL="0" indent="0">
+              <a:buNone/>
+            </a:pPr>
+            <a:r>
+              <a:rPr lang="es-NI" dirty="0"/>
+              <a:t>Observación</a:t>
+            </a:r>
+            <a:r>
+              <a:rPr lang="es-NI" dirty="0" smtClean="0"/>
+              <a:t>:  Identificamos </a:t>
+            </a:r>
+            <a:r>
+              <a:rPr lang="es-NI" dirty="0"/>
+              <a:t>el problema y elaboramos el objetivo y la </a:t>
+            </a:r>
+            <a:r>
+              <a:rPr lang="es-NI" dirty="0" smtClean="0"/>
+              <a:t>propuesta.</a:t>
+            </a:r>
+          </a:p>
+          <a:p>
+            <a:pPr marL="0" indent="0">
+              <a:buNone/>
+            </a:pPr>
+            <a:r>
+              <a:rPr lang="es-NI" dirty="0" smtClean="0"/>
+              <a:t>Científico: </a:t>
+            </a:r>
+            <a:r>
+              <a:rPr lang="es-NI" dirty="0"/>
+              <a:t>S</a:t>
+            </a:r>
+            <a:r>
+              <a:rPr lang="es-NI" dirty="0" smtClean="0"/>
+              <a:t>irvió </a:t>
+            </a:r>
+            <a:r>
+              <a:rPr lang="es-NI" dirty="0"/>
+              <a:t>para la definición del problema y la formulación del mismo.</a:t>
+            </a:r>
+            <a:endParaRPr lang="es-NI" dirty="0" smtClean="0"/>
+          </a:p>
+          <a:p>
+            <a:pPr marL="0" indent="0">
+              <a:buNone/>
+            </a:pPr>
+            <a:r>
+              <a:rPr lang="es-NI" dirty="0" smtClean="0"/>
+              <a:t>Técnicas: Se utilizó el instrumento de La entrevista.</a:t>
+            </a:r>
+            <a:endParaRPr lang="en-US" dirty="0"/>
+          </a:p>
+          <a:p>
+            <a:pPr marL="0" indent="0">
+              <a:buNone/>
+            </a:pPr>
+            <a:endParaRPr lang="en-US" dirty="0"/>
           </a:p>
         </p:txBody>
       </p:sp>
     </p:spTree>
     <p:extLst>
       <p:ext uri="{BB962C8B-B14F-4D97-AF65-F5344CB8AC3E}">
-        <p14:creationId xmlns:p14="http://schemas.microsoft.com/office/powerpoint/2010/main" val="2342696254"/>
+        <p14:creationId xmlns:p14="http://schemas.microsoft.com/office/powerpoint/2010/main" val="1814829229"/>
       </p:ext>
     </p:extLst>
   </p:cSld>
@@ -8796,6 +9040,415 @@
         </p:nvSpPr>
         <p:spPr>
           <a:xfrm>
+            <a:off x="1640156" y="362853"/>
+            <a:ext cx="8911687" cy="615715"/>
+          </a:xfrm>
+        </p:spPr>
+        <p:txBody>
+          <a:bodyPr>
+            <a:normAutofit fontScale="90000"/>
+          </a:bodyPr>
+          <a:lstStyle/>
+          <a:p>
+            <a:pPr algn="ctr"/>
+            <a:r>
+              <a:rPr lang="es-NI" b="1" dirty="0" smtClean="0"/>
+              <a:t>METODOLOGÍA</a:t>
+            </a:r>
+            <a:endParaRPr lang="en-US" dirty="0"/>
+          </a:p>
+        </p:txBody>
+      </p:sp>
+      <p:sp>
+        <p:nvSpPr>
+          <p:cNvPr id="8" name="Marcador de contenido 2"/>
+          <p:cNvSpPr>
+            <a:spLocks noGrp="1"/>
+          </p:cNvSpPr>
+          <p:nvPr>
+            <p:ph idx="1"/>
+          </p:nvPr>
+        </p:nvSpPr>
+        <p:spPr>
+          <a:xfrm>
+            <a:off x="1640156" y="978568"/>
+            <a:ext cx="9751631" cy="5677039"/>
+          </a:xfrm>
+        </p:spPr>
+        <p:txBody>
+          <a:bodyPr>
+            <a:noAutofit/>
+          </a:bodyPr>
+          <a:lstStyle/>
+          <a:p>
+            <a:r>
+              <a:rPr lang="es-NI" b="1" dirty="0"/>
+              <a:t>Población</a:t>
+            </a:r>
+            <a:endParaRPr lang="en-US" b="1" dirty="0"/>
+          </a:p>
+          <a:p>
+            <a:pPr marL="400050" lvl="1" indent="0">
+              <a:lnSpc>
+                <a:spcPct val="150000"/>
+              </a:lnSpc>
+              <a:buNone/>
+            </a:pPr>
+            <a:r>
+              <a:rPr lang="es-NI" sz="1800" dirty="0" smtClean="0">
+                <a:latin typeface="Arial" panose="020B0604020202020204" pitchFamily="34" charset="0"/>
+                <a:cs typeface="Arial" panose="020B0604020202020204" pitchFamily="34" charset="0"/>
+              </a:rPr>
+              <a:t>Para realizar una investigación, no es necesario abarcar la totalidad de una población basta con elegir una muestra representativa de la misma. En nuestro caso con fines de incluir a los involucrados en el proceso que tiene que ver con el registro de notas de los estudiantes, entrevistamos a 12 docentes de un total de 12, esto corresponde a una muestra del 100%, administrativos entrevistamos al 100%. </a:t>
+            </a:r>
+          </a:p>
+          <a:p>
+            <a:pPr>
+              <a:lnSpc>
+                <a:spcPct val="150000"/>
+              </a:lnSpc>
+            </a:pPr>
+            <a:r>
+              <a:rPr lang="es-NI" dirty="0" smtClean="0">
+                <a:latin typeface="Arial" panose="020B0604020202020204" pitchFamily="34" charset="0"/>
+                <a:cs typeface="Arial" panose="020B0604020202020204" pitchFamily="34" charset="0"/>
+              </a:rPr>
+              <a:t>Las entrevistas se aplicaron a mediados del tercer trimestre del año lectivo 2020, fueron hechas de manera personal en forma de entrevista, a docentes, personal administrativo y a el director de UML </a:t>
+            </a:r>
+            <a:r>
+              <a:rPr lang="es-NI" dirty="0" err="1" smtClean="0">
+                <a:latin typeface="Arial" panose="020B0604020202020204" pitchFamily="34" charset="0"/>
+                <a:cs typeface="Arial" panose="020B0604020202020204" pitchFamily="34" charset="0"/>
+              </a:rPr>
+              <a:t>Quilalí</a:t>
+            </a:r>
+            <a:r>
+              <a:rPr lang="es-NI" dirty="0" smtClean="0">
+                <a:latin typeface="Arial" panose="020B0604020202020204" pitchFamily="34" charset="0"/>
+                <a:cs typeface="Arial" panose="020B0604020202020204" pitchFamily="34" charset="0"/>
+              </a:rPr>
+              <a:t>. </a:t>
+            </a:r>
+            <a:endParaRPr lang="en-US" dirty="0">
+              <a:latin typeface="Arial" panose="020B0604020202020204" pitchFamily="34" charset="0"/>
+              <a:cs typeface="Arial" panose="020B0604020202020204" pitchFamily="34" charset="0"/>
+            </a:endParaRPr>
+          </a:p>
+          <a:p>
+            <a:pPr>
+              <a:lnSpc>
+                <a:spcPct val="150000"/>
+              </a:lnSpc>
+            </a:pPr>
+            <a:r>
+              <a:rPr lang="es-NI" dirty="0"/>
+              <a:t> </a:t>
+            </a:r>
+            <a:r>
+              <a:rPr lang="es-NI" dirty="0">
+                <a:latin typeface="Arial" panose="020B0604020202020204" pitchFamily="34" charset="0"/>
+                <a:cs typeface="Arial" panose="020B0604020202020204" pitchFamily="34" charset="0"/>
+              </a:rPr>
+              <a:t>De </a:t>
+            </a:r>
+            <a:r>
+              <a:rPr lang="es-NI" dirty="0">
+                <a:latin typeface="Arial" panose="020B0604020202020204" pitchFamily="34" charset="0"/>
+                <a:cs typeface="Arial" panose="020B0604020202020204" pitchFamily="34" charset="0"/>
+              </a:rPr>
+              <a:t>acuerdo a todo esto, se elaboró satisfactoriamente el sistema “SIS Universidad”.</a:t>
+            </a:r>
+            <a:endParaRPr lang="en-US" dirty="0">
+              <a:latin typeface="Arial" panose="020B0604020202020204" pitchFamily="34" charset="0"/>
+              <a:cs typeface="Arial" panose="020B0604020202020204" pitchFamily="34" charset="0"/>
+            </a:endParaRPr>
+          </a:p>
+          <a:p>
+            <a:pPr marL="400050" lvl="1" indent="0">
+              <a:lnSpc>
+                <a:spcPct val="150000"/>
+              </a:lnSpc>
+              <a:buNone/>
+            </a:pPr>
+            <a:endParaRPr lang="en-US" sz="1800" dirty="0">
+              <a:latin typeface="Arial" panose="020B0604020202020204" pitchFamily="34" charset="0"/>
+              <a:cs typeface="Arial" panose="020B0604020202020204" pitchFamily="34" charset="0"/>
+            </a:endParaRPr>
+          </a:p>
+          <a:p>
+            <a:pPr marL="0" indent="0">
+              <a:buNone/>
+            </a:pPr>
+            <a:endParaRPr lang="en-US" dirty="0"/>
+          </a:p>
+        </p:txBody>
+      </p:sp>
+    </p:spTree>
+    <p:extLst>
+      <p:ext uri="{BB962C8B-B14F-4D97-AF65-F5344CB8AC3E}">
+        <p14:creationId xmlns:p14="http://schemas.microsoft.com/office/powerpoint/2010/main" val="3049012013"/>
+      </p:ext>
+    </p:extLst>
+  </p:cSld>
+  <p:clrMapOvr>
+    <a:masterClrMapping/>
+  </p:clrMapOvr>
+  <p:timing>
+    <p:tnLst>
+      <p:par>
+        <p:cTn id="1" dur="indefinite" restart="never" nodeType="tmRoot"/>
+      </p:par>
+    </p:tnLst>
+  </p:timing>
+</p:sld>
+</file>
+
+<file path=ppt/slides/slide14.xml><?xml version="1.0" encoding="utf-8"?>
+<p:sld xmlns:a="http://schemas.openxmlformats.org/drawingml/2006/main" xmlns:r="http://schemas.openxmlformats.org/officeDocument/2006/relationships" xmlns:p="http://schemas.openxmlformats.org/presentationml/2006/main">
+  <p:cSld>
+    <p:spTree>
+      <p:nvGrpSpPr>
+        <p:cNvPr id="1" name=""/>
+        <p:cNvGrpSpPr/>
+        <p:nvPr/>
+      </p:nvGrpSpPr>
+      <p:grpSpPr>
+        <a:xfrm>
+          <a:off x="0" y="0"/>
+          <a:ext cx="0" cy="0"/>
+          <a:chOff x="0" y="0"/>
+          <a:chExt cx="0" cy="0"/>
+        </a:xfrm>
+      </p:grpSpPr>
+      <p:sp>
+        <p:nvSpPr>
+          <p:cNvPr id="2" name="Título 1"/>
+          <p:cNvSpPr>
+            <a:spLocks noGrp="1"/>
+          </p:cNvSpPr>
+          <p:nvPr>
+            <p:ph type="title"/>
+          </p:nvPr>
+        </p:nvSpPr>
+        <p:spPr>
+          <a:xfrm>
+            <a:off x="1549066" y="986589"/>
+            <a:ext cx="10507578" cy="5414211"/>
+          </a:xfrm>
+        </p:spPr>
+        <p:txBody>
+          <a:bodyPr>
+            <a:noAutofit/>
+          </a:bodyPr>
+          <a:lstStyle/>
+          <a:p>
+            <a:r>
+              <a:rPr lang="es-NI" sz="2000" dirty="0" smtClean="0">
+                <a:latin typeface="Arial" panose="020B0604020202020204" pitchFamily="34" charset="0"/>
+                <a:cs typeface="Arial" panose="020B0604020202020204" pitchFamily="34" charset="0"/>
+              </a:rPr>
+              <a:t>Concluimos </a:t>
+            </a:r>
+            <a:r>
+              <a:rPr lang="es-NI" sz="2000" dirty="0">
+                <a:latin typeface="Arial" panose="020B0604020202020204" pitchFamily="34" charset="0"/>
+                <a:cs typeface="Arial" panose="020B0604020202020204" pitchFamily="34" charset="0"/>
+              </a:rPr>
+              <a:t>que el sistema de registro de notas fue una excelente experiencia y un buen desafío para nuestros límites, nuestras indagaciones sobre apropiarnos de la forma de trabajo tradicional que realiza el área de registro académico, fue de mucha ayuda ya que de esta forma pudimos tener una visión más clara del objetivo que debíamos alcanzar, ya que pudimos observar la dificultad y lo tedioso que resulta manejar ese gran volumen de datos.</a:t>
+            </a:r>
+            <a:r>
+              <a:rPr lang="en-US" sz="2000" dirty="0">
+                <a:latin typeface="Arial" panose="020B0604020202020204" pitchFamily="34" charset="0"/>
+                <a:cs typeface="Arial" panose="020B0604020202020204" pitchFamily="34" charset="0"/>
+              </a:rPr>
+              <a:t/>
+            </a:r>
+            <a:br>
+              <a:rPr lang="en-US" sz="2000" dirty="0">
+                <a:latin typeface="Arial" panose="020B0604020202020204" pitchFamily="34" charset="0"/>
+                <a:cs typeface="Arial" panose="020B0604020202020204" pitchFamily="34" charset="0"/>
+              </a:rPr>
+            </a:br>
+            <a:r>
+              <a:rPr lang="es-NI" sz="2000" dirty="0">
+                <a:latin typeface="Arial" panose="020B0604020202020204" pitchFamily="34" charset="0"/>
+                <a:cs typeface="Arial" panose="020B0604020202020204" pitchFamily="34" charset="0"/>
+              </a:rPr>
+              <a:t> </a:t>
+            </a:r>
+            <a:r>
+              <a:rPr lang="en-US" sz="2000" dirty="0">
+                <a:latin typeface="Arial" panose="020B0604020202020204" pitchFamily="34" charset="0"/>
+                <a:cs typeface="Arial" panose="020B0604020202020204" pitchFamily="34" charset="0"/>
+              </a:rPr>
+              <a:t/>
+            </a:r>
+            <a:br>
+              <a:rPr lang="en-US" sz="2000" dirty="0">
+                <a:latin typeface="Arial" panose="020B0604020202020204" pitchFamily="34" charset="0"/>
+                <a:cs typeface="Arial" panose="020B0604020202020204" pitchFamily="34" charset="0"/>
+              </a:rPr>
+            </a:br>
+            <a:r>
+              <a:rPr lang="es-NI" sz="2000" dirty="0">
+                <a:latin typeface="Arial" panose="020B0604020202020204" pitchFamily="34" charset="0"/>
+                <a:cs typeface="Arial" panose="020B0604020202020204" pitchFamily="34" charset="0"/>
+              </a:rPr>
+              <a:t>Encontramos que el personal administrativo como los docentes hacen un esfuerzo muy grande por garantizar de manera física (escrita en formato de notas) los resultados académicos de los estudiantes de cada corte evaluativo.</a:t>
+            </a:r>
+            <a:r>
+              <a:rPr lang="en-US" sz="2000" dirty="0">
+                <a:latin typeface="Arial" panose="020B0604020202020204" pitchFamily="34" charset="0"/>
+                <a:cs typeface="Arial" panose="020B0604020202020204" pitchFamily="34" charset="0"/>
+              </a:rPr>
+              <a:t/>
+            </a:r>
+            <a:br>
+              <a:rPr lang="en-US" sz="2000" dirty="0">
+                <a:latin typeface="Arial" panose="020B0604020202020204" pitchFamily="34" charset="0"/>
+                <a:cs typeface="Arial" panose="020B0604020202020204" pitchFamily="34" charset="0"/>
+              </a:rPr>
+            </a:br>
+            <a:r>
+              <a:rPr lang="es-NI" sz="2000" dirty="0">
+                <a:latin typeface="Arial" panose="020B0604020202020204" pitchFamily="34" charset="0"/>
+                <a:cs typeface="Arial" panose="020B0604020202020204" pitchFamily="34" charset="0"/>
+              </a:rPr>
+              <a:t> </a:t>
+            </a:r>
+            <a:r>
+              <a:rPr lang="en-US" sz="2000" dirty="0">
+                <a:latin typeface="Arial" panose="020B0604020202020204" pitchFamily="34" charset="0"/>
+                <a:cs typeface="Arial" panose="020B0604020202020204" pitchFamily="34" charset="0"/>
+              </a:rPr>
+              <a:t/>
+            </a:r>
+            <a:br>
+              <a:rPr lang="en-US" sz="2000" dirty="0">
+                <a:latin typeface="Arial" panose="020B0604020202020204" pitchFamily="34" charset="0"/>
+                <a:cs typeface="Arial" panose="020B0604020202020204" pitchFamily="34" charset="0"/>
+              </a:rPr>
+            </a:br>
+            <a:r>
+              <a:rPr lang="es-NI" sz="2000" dirty="0">
+                <a:latin typeface="Arial" panose="020B0604020202020204" pitchFamily="34" charset="0"/>
+                <a:cs typeface="Arial" panose="020B0604020202020204" pitchFamily="34" charset="0"/>
+              </a:rPr>
+              <a:t>Creado el sistema en línea “SIS Universidad”, para que los docentes puedan realizar el registro de notas de los alumnos, inclusive desde su casa, en caso de no tener los medios tecnológicos, pueden hacerlo desde las instalaciones de la universidad o en último caso, pueden entregar su formato en físico para que el personal de registro académico </a:t>
+            </a:r>
+            <a:r>
+              <a:rPr lang="es-NI" sz="2000" dirty="0" smtClean="0">
+                <a:latin typeface="Arial" panose="020B0604020202020204" pitchFamily="34" charset="0"/>
+                <a:cs typeface="Arial" panose="020B0604020202020204" pitchFamily="34" charset="0"/>
+              </a:rPr>
+              <a:t>ingrese </a:t>
+            </a:r>
+            <a:r>
+              <a:rPr lang="es-NI" sz="2000" dirty="0">
+                <a:latin typeface="Arial" panose="020B0604020202020204" pitchFamily="34" charset="0"/>
+                <a:cs typeface="Arial" panose="020B0604020202020204" pitchFamily="34" charset="0"/>
+              </a:rPr>
+              <a:t>las notas al sistema. Los reportes de notas se pueden generar de forma inmediata por los usuarios administrativos que le consulten</a:t>
+            </a:r>
+            <a:r>
+              <a:rPr lang="es-NI" sz="2000" dirty="0" smtClean="0">
+                <a:latin typeface="Arial" panose="020B0604020202020204" pitchFamily="34" charset="0"/>
+                <a:cs typeface="Arial" panose="020B0604020202020204" pitchFamily="34" charset="0"/>
+              </a:rPr>
+              <a:t>.</a:t>
+            </a:r>
+            <a:r>
+              <a:rPr lang="es-NI" sz="1400" dirty="0" smtClean="0">
+                <a:latin typeface="Arial" panose="020B0604020202020204" pitchFamily="34" charset="0"/>
+                <a:cs typeface="Arial" panose="020B0604020202020204" pitchFamily="34" charset="0"/>
+              </a:rPr>
+              <a:t> </a:t>
+            </a:r>
+            <a:endParaRPr lang="en-US" sz="1500" dirty="0">
+              <a:latin typeface="Arial" panose="020B0604020202020204" pitchFamily="34" charset="0"/>
+              <a:cs typeface="Arial" panose="020B0604020202020204" pitchFamily="34" charset="0"/>
+            </a:endParaRPr>
+          </a:p>
+        </p:txBody>
+      </p:sp>
+      <p:sp>
+        <p:nvSpPr>
+          <p:cNvPr id="3" name="Rectángulo 2"/>
+          <p:cNvSpPr/>
+          <p:nvPr/>
+        </p:nvSpPr>
+        <p:spPr>
+          <a:xfrm>
+            <a:off x="1549066" y="158234"/>
+            <a:ext cx="2927404" cy="523220"/>
+          </a:xfrm>
+          <a:prstGeom prst="rect">
+            <a:avLst/>
+          </a:prstGeom>
+        </p:spPr>
+        <p:txBody>
+          <a:bodyPr wrap="none">
+            <a:spAutoFit/>
+          </a:bodyPr>
+          <a:lstStyle/>
+          <a:p>
+            <a:r>
+              <a:rPr lang="es-NI" sz="2800" b="1" dirty="0" smtClean="0"/>
+              <a:t>CONCLUSIONES</a:t>
+            </a:r>
+            <a:endParaRPr lang="en-US" sz="2800" dirty="0"/>
+          </a:p>
+        </p:txBody>
+      </p:sp>
+    </p:spTree>
+    <p:extLst>
+      <p:ext uri="{BB962C8B-B14F-4D97-AF65-F5344CB8AC3E}">
+        <p14:creationId xmlns:p14="http://schemas.microsoft.com/office/powerpoint/2010/main" val="2342696254"/>
+      </p:ext>
+    </p:extLst>
+  </p:cSld>
+  <p:clrMapOvr>
+    <a:masterClrMapping/>
+  </p:clrMapOvr>
+  <p:timing>
+    <p:tnLst>
+      <p:par>
+        <p:cTn id="1" dur="indefinite" restart="never" nodeType="tmRoot"/>
+      </p:par>
+    </p:tnLst>
+  </p:timing>
+</p:sld>
+</file>
+
+<file path=ppt/slides/slide15.xml><?xml version="1.0" encoding="utf-8"?>
+<p:sld xmlns:a="http://schemas.openxmlformats.org/drawingml/2006/main" xmlns:r="http://schemas.openxmlformats.org/officeDocument/2006/relationships" xmlns:p="http://schemas.openxmlformats.org/presentationml/2006/main">
+  <p:cSld>
+    <p:spTree>
+      <p:nvGrpSpPr>
+        <p:cNvPr id="1" name=""/>
+        <p:cNvGrpSpPr/>
+        <p:nvPr/>
+      </p:nvGrpSpPr>
+      <p:grpSpPr>
+        <a:xfrm>
+          <a:off x="0" y="0"/>
+          <a:ext cx="0" cy="0"/>
+          <a:chOff x="0" y="0"/>
+          <a:chExt cx="0" cy="0"/>
+        </a:xfrm>
+      </p:grpSpPr>
+      <p:sp>
+        <p:nvSpPr>
+          <p:cNvPr id="2" name="Título 1"/>
+          <p:cNvSpPr>
+            <a:spLocks noGrp="1"/>
+          </p:cNvSpPr>
+          <p:nvPr>
+            <p:ph type="title"/>
+          </p:nvPr>
+        </p:nvSpPr>
+        <p:spPr>
+          <a:xfrm>
             <a:off x="1676400" y="910499"/>
             <a:ext cx="10515600" cy="5509351"/>
           </a:xfrm>
@@ -8929,7 +9582,7 @@
 </p:sld>
 </file>
 
-<file path=ppt/slides/slide14.xml><?xml version="1.0" encoding="utf-8"?>
+<file path=ppt/slides/slide16.xml><?xml version="1.0" encoding="utf-8"?>
 <p:sld xmlns:a="http://schemas.openxmlformats.org/drawingml/2006/main" xmlns:r="http://schemas.openxmlformats.org/officeDocument/2006/relationships" xmlns:p="http://schemas.openxmlformats.org/presentationml/2006/main">
   <p:cSld>
     <p:spTree>
@@ -9118,8 +9771,8 @@
               <a:rPr lang="en-US" sz="1900" dirty="0"/>
             </a:br>
             <a:r>
-              <a:rPr lang="es-NI" sz="1900" dirty="0"/>
-              <a:t>Tutor(a):</a:t>
+              <a:rPr lang="es-NI" sz="1900" dirty="0" smtClean="0"/>
+              <a:t>Tutor:</a:t>
             </a:r>
             <a:r>
               <a:rPr lang="en-US" sz="1900" dirty="0"/>
@@ -9899,15 +10552,27 @@
             <a:pPr algn="ctr"/>
             <a:r>
               <a:rPr lang="es-NI" sz="2000" dirty="0"/>
-              <a:t>Sistema de notas de la universidad Martin Lutero extensión </a:t>
-            </a:r>
-            <a:r>
-              <a:rPr lang="es-NI" sz="2000" dirty="0" err="1"/>
-              <a:t>Quilali</a:t>
+              <a:t>Sistema de notas de la </a:t>
+            </a:r>
+            <a:r>
+              <a:rPr lang="es-NI" sz="2000" dirty="0" smtClean="0"/>
+              <a:t>Universidad Martín </a:t>
             </a:r>
             <a:r>
               <a:rPr lang="es-NI" sz="2000" dirty="0"/>
-              <a:t>, Departamento de Nueva Segovia.</a:t>
+              <a:t>Lutero extensión </a:t>
+            </a:r>
+            <a:r>
+              <a:rPr lang="es-NI" sz="2000" dirty="0" err="1" smtClean="0"/>
+              <a:t>Quilalí</a:t>
+            </a:r>
+            <a:r>
+              <a:rPr lang="es-NI" sz="2000" dirty="0" smtClean="0"/>
+              <a:t>, </a:t>
+            </a:r>
+            <a:r>
+              <a:rPr lang="es-NI" sz="2000" dirty="0"/>
+              <a:t>Departamento de Nueva Segovia.</a:t>
             </a:r>
             <a:endParaRPr lang="en-US" sz="2000" dirty="0"/>
           </a:p>
@@ -10156,7 +10821,23 @@
             <a:pPr lvl="0" algn="just"/>
             <a:r>
               <a:rPr lang="es-NI" sz="2400" dirty="0"/>
-              <a:t>Mejorar los procesos y el tiempo de atención a estudiantes y docentes en el área de registro académico de Universidad Martin Lutero, sede </a:t>
+              <a:t>Mejorar </a:t>
+            </a:r>
+            <a:r>
+              <a:rPr lang="es-NI" sz="2400" dirty="0" smtClean="0"/>
+              <a:t>el </a:t>
+            </a:r>
+            <a:r>
+              <a:rPr lang="es-NI" sz="2400" dirty="0"/>
+              <a:t>tiempo de atención a estudiantes y docentes en el área de registro académico de Universidad </a:t>
+            </a:r>
+            <a:r>
+              <a:rPr lang="es-NI" sz="2400" dirty="0" smtClean="0"/>
+              <a:t>Martín </a:t>
+            </a:r>
+            <a:r>
+              <a:rPr lang="es-NI" sz="2400" dirty="0"/>
+              <a:t>Lutero, sede </a:t>
             </a:r>
             <a:r>
               <a:rPr lang="es-NI" sz="2400" dirty="0" err="1"/>
@@ -10429,7 +11110,15 @@
             </a:r>
             <a:r>
               <a:rPr lang="es-NI" sz="2000" dirty="0"/>
-              <a:t>el año 2014 un grupo de jóvenes egresados de la universidad Martin Lutero en la ciudad de Managua crearon un sistema llamado SAU (Servicio Académico Universitario) el cual tiene la capacidad de funcionar en una red local, pero lamentablemente no pudo ser funcional ya que no se tenía el personal técnico para configurarlo en el área de registro académico de UML </a:t>
+              <a:t>el año 2014 un grupo de jóvenes egresados de la universidad Martin Lutero en la ciudad de Managua crearon un sistema llamado SAU </a:t>
+            </a:r>
+            <a:r>
+              <a:rPr lang="es-NI" sz="2000" dirty="0" smtClean="0"/>
+              <a:t>(Sistema de Administración Universitaria) </a:t>
+            </a:r>
+            <a:r>
+              <a:rPr lang="es-NI" sz="2000" dirty="0"/>
+              <a:t>el cual tiene la capacidad de funcionar en una red local, pero lamentablemente no pudo ser funcional ya que no se tenía el personal técnico para configurarlo en el área de registro académico de UML </a:t>
             </a:r>
             <a:r>
               <a:rPr lang="es-NI" sz="2000" dirty="0" err="1"/>
@@ -10828,7 +11517,15 @@
             </a:r>
             <a:r>
               <a:rPr lang="es-NI" sz="2000" dirty="0"/>
-              <a:t>propuesta consiste en la programación del sistema de notas para optimizar, agilizar y mejorar todos los procesos administrativos y académicos que se llevan a cabo dentro de la Universidad con la finalidad de agradar y proporcionar un mejor servicio mejorado a los representantes del alumnado; así como también optimizar la manera en que el que control de notas se lleva a cabo.</a:t>
+              <a:t>propuesta consiste en la programación del sistema de notas para optimizar, agilizar y mejorar todos los procesos administrativos y académicos que se llevan a cabo dentro de la </a:t>
+            </a:r>
+            <a:r>
+              <a:rPr lang="es-NI" sz="2000" dirty="0" smtClean="0"/>
+              <a:t>Universidad, </a:t>
+            </a:r>
+            <a:r>
+              <a:rPr lang="es-NI" sz="2000" dirty="0"/>
+              <a:t>con la finalidad de agradar y proporcionar un mejor servicio mejorado a los representantes del alumnado; así como también optimizar la manera en que el que control de notas se lleva a cabo.</a:t>
             </a:r>
             <a:endParaRPr lang="en-US" sz="2000" dirty="0"/>
           </a:p>
@@ -10852,7 +11549,15 @@
             </a:r>
             <a:r>
               <a:rPr lang="es-NI" sz="2000" dirty="0"/>
-              <a:t>a toda la Universidad; nosotros mismos realizamos el sistema de notas aplicando los conocimientos impartidos por nuestros maestros durante los años.</a:t>
+              <a:t>a toda la Universidad; </a:t>
+            </a:r>
+            <a:r>
+              <a:rPr lang="es-NI" sz="2000" dirty="0" smtClean="0"/>
+              <a:t>se realizó </a:t>
+            </a:r>
+            <a:r>
+              <a:rPr lang="es-NI" sz="2000" dirty="0"/>
+              <a:t>el sistema de notas aplicando los conocimientos impartidos por nuestros maestros durante los años.</a:t>
             </a:r>
             <a:endParaRPr lang="en-US" sz="2000" dirty="0"/>
           </a:p>

</xml_diff>